<commit_message>
Added tensorflow datasets for testing + began efficientnet
</commit_message>
<xml_diff>
--- a/documentation/Supervisor Meetings/CycleGAN-VIGAN.pptx
+++ b/documentation/Supervisor Meetings/CycleGAN-VIGAN.pptx
@@ -277,7 +277,7 @@
           <a:p>
             <a:fld id="{389A37BA-A3AC-4564-85C2-2DC88E72F5EC}" type="datetimeFigureOut">
               <a:rPr lang="en-GB" smtClean="0"/>
-              <a:t>02/11/2020</a:t>
+              <a:t>20/11/2020</a:t>
             </a:fld>
             <a:endParaRPr lang="en-GB"/>
           </a:p>
@@ -477,7 +477,7 @@
           <a:p>
             <a:fld id="{389A37BA-A3AC-4564-85C2-2DC88E72F5EC}" type="datetimeFigureOut">
               <a:rPr lang="en-GB" smtClean="0"/>
-              <a:t>02/11/2020</a:t>
+              <a:t>20/11/2020</a:t>
             </a:fld>
             <a:endParaRPr lang="en-GB"/>
           </a:p>
@@ -687,7 +687,7 @@
           <a:p>
             <a:fld id="{389A37BA-A3AC-4564-85C2-2DC88E72F5EC}" type="datetimeFigureOut">
               <a:rPr lang="en-GB" smtClean="0"/>
-              <a:t>02/11/2020</a:t>
+              <a:t>20/11/2020</a:t>
             </a:fld>
             <a:endParaRPr lang="en-GB"/>
           </a:p>
@@ -887,7 +887,7 @@
           <a:p>
             <a:fld id="{389A37BA-A3AC-4564-85C2-2DC88E72F5EC}" type="datetimeFigureOut">
               <a:rPr lang="en-GB" smtClean="0"/>
-              <a:t>02/11/2020</a:t>
+              <a:t>20/11/2020</a:t>
             </a:fld>
             <a:endParaRPr lang="en-GB"/>
           </a:p>
@@ -1163,7 +1163,7 @@
           <a:p>
             <a:fld id="{389A37BA-A3AC-4564-85C2-2DC88E72F5EC}" type="datetimeFigureOut">
               <a:rPr lang="en-GB" smtClean="0"/>
-              <a:t>02/11/2020</a:t>
+              <a:t>20/11/2020</a:t>
             </a:fld>
             <a:endParaRPr lang="en-GB"/>
           </a:p>
@@ -1431,7 +1431,7 @@
           <a:p>
             <a:fld id="{389A37BA-A3AC-4564-85C2-2DC88E72F5EC}" type="datetimeFigureOut">
               <a:rPr lang="en-GB" smtClean="0"/>
-              <a:t>02/11/2020</a:t>
+              <a:t>20/11/2020</a:t>
             </a:fld>
             <a:endParaRPr lang="en-GB"/>
           </a:p>
@@ -1846,7 +1846,7 @@
           <a:p>
             <a:fld id="{389A37BA-A3AC-4564-85C2-2DC88E72F5EC}" type="datetimeFigureOut">
               <a:rPr lang="en-GB" smtClean="0"/>
-              <a:t>02/11/2020</a:t>
+              <a:t>20/11/2020</a:t>
             </a:fld>
             <a:endParaRPr lang="en-GB"/>
           </a:p>
@@ -1988,7 +1988,7 @@
           <a:p>
             <a:fld id="{389A37BA-A3AC-4564-85C2-2DC88E72F5EC}" type="datetimeFigureOut">
               <a:rPr lang="en-GB" smtClean="0"/>
-              <a:t>02/11/2020</a:t>
+              <a:t>20/11/2020</a:t>
             </a:fld>
             <a:endParaRPr lang="en-GB"/>
           </a:p>
@@ -2101,7 +2101,7 @@
           <a:p>
             <a:fld id="{389A37BA-A3AC-4564-85C2-2DC88E72F5EC}" type="datetimeFigureOut">
               <a:rPr lang="en-GB" smtClean="0"/>
-              <a:t>02/11/2020</a:t>
+              <a:t>20/11/2020</a:t>
             </a:fld>
             <a:endParaRPr lang="en-GB"/>
           </a:p>
@@ -2414,7 +2414,7 @@
           <a:p>
             <a:fld id="{389A37BA-A3AC-4564-85C2-2DC88E72F5EC}" type="datetimeFigureOut">
               <a:rPr lang="en-GB" smtClean="0"/>
-              <a:t>02/11/2020</a:t>
+              <a:t>20/11/2020</a:t>
             </a:fld>
             <a:endParaRPr lang="en-GB"/>
           </a:p>
@@ -2703,7 +2703,7 @@
           <a:p>
             <a:fld id="{389A37BA-A3AC-4564-85C2-2DC88E72F5EC}" type="datetimeFigureOut">
               <a:rPr lang="en-GB" smtClean="0"/>
-              <a:t>02/11/2020</a:t>
+              <a:t>20/11/2020</a:t>
             </a:fld>
             <a:endParaRPr lang="en-GB"/>
           </a:p>
@@ -2946,7 +2946,7 @@
           <a:p>
             <a:fld id="{389A37BA-A3AC-4564-85C2-2DC88E72F5EC}" type="datetimeFigureOut">
               <a:rPr lang="en-GB" smtClean="0"/>
-              <a:t>02/11/2020</a:t>
+              <a:t>20/11/2020</a:t>
             </a:fld>
             <a:endParaRPr lang="en-GB"/>
           </a:p>
@@ -3587,7 +3587,15 @@
           <a:p>
             <a:r>
               <a:rPr lang="en-GB" dirty="0"/>
-              <a:t>The method proposed in the paper can handle both the multi-view (where different views describe distinct perspectives) and multi-modal (data for more than one model) missing data problem.</a:t>
+              <a:t>The method proposed in the paper can handle both the multi-view (where different views describe distinct perspectives) </a:t>
+            </a:r>
+            <a:r>
+              <a:rPr lang="en-GB"/>
+              <a:t>and multi-modal </a:t>
+            </a:r>
+            <a:r>
+              <a:rPr lang="en-GB" dirty="0"/>
+              <a:t>(data for more than one model) missing data problem.</a:t>
             </a:r>
           </a:p>
           <a:p>
@@ -4661,7 +4669,7 @@
           <a:p>
             <a:r>
               <a:rPr lang="en-GB" dirty="0"/>
-              <a:t>The key to GANs’ success is the idea of an adversarial loss that forces the generated images to be, indistinguishable from real photos. This loss is particularly powerful for image generation tasks, as this is the objective that much of computer graphics aims to optimise.</a:t>
+              <a:t>The key to GANs’ success is the idea of an adversarial loss that forces the generated images to be indistinguishable from real photos. This loss is particularly powerful for image generation tasks, as this is the objective that much of computer graphics aims to optimise.</a:t>
             </a:r>
           </a:p>
           <a:p>

</xml_diff>